<commit_message>
acpt: add scenarios for Font.bold
* didn’t add them during original implementation of Font.bold
* improve wording of Font.size then clause
</commit_message>
<xml_diff>
--- a/features/steps/test_files/txt-font-props.pptx
+++ b/features/steps/test_files/txt-font-props.pptx
@@ -7,6 +7,7 @@
   <p:sldIdLst>
     <p:sldId id="256" r:id="rId2"/>
     <p:sldId id="257" r:id="rId3"/>
+    <p:sldId id="258" r:id="rId4"/>
   </p:sldIdLst>
   <p:sldSz cx="9144000" cy="6858000" type="screen4x3"/>
   <p:notesSz cx="6858000" cy="9144000"/>
@@ -572,6 +573,126 @@
 </p:sld>
 </file>
 
+<file path=ppt/slides/slide3.xml><?xml version="1.0" encoding="utf-8"?>
+<p:sld xmlns:a="http://schemas.openxmlformats.org/drawingml/2006/main" xmlns:r="http://schemas.openxmlformats.org/officeDocument/2006/relationships" xmlns:p="http://schemas.openxmlformats.org/presentationml/2006/main">
+  <p:cSld>
+    <p:spTree>
+      <p:nvGrpSpPr>
+        <p:cNvPr id="1" name=""/>
+        <p:cNvGrpSpPr/>
+        <p:nvPr/>
+      </p:nvGrpSpPr>
+      <p:grpSpPr>
+        <a:xfrm>
+          <a:off x="0" y="0"/>
+          <a:ext cx="0" cy="0"/>
+          <a:chOff x="0" y="0"/>
+          <a:chExt cx="0" cy="0"/>
+        </a:xfrm>
+      </p:grpSpPr>
+      <p:sp>
+        <p:nvSpPr>
+          <p:cNvPr id="2" name="TextBox 1"/>
+          <p:cNvSpPr txBox="1"/>
+          <p:nvPr/>
+        </p:nvSpPr>
+        <p:spPr>
+          <a:xfrm>
+            <a:off x="4121302" y="1437501"/>
+            <a:ext cx="918866" cy="369332"/>
+          </a:xfrm>
+          <a:prstGeom prst="rect">
+            <a:avLst/>
+          </a:prstGeom>
+          <a:noFill/>
+        </p:spPr>
+        <p:txBody>
+          <a:bodyPr wrap="none" rtlCol="0">
+            <a:spAutoFit/>
+          </a:bodyPr>
+          <a:lstStyle/>
+          <a:p>
+            <a:r>
+              <a:rPr lang="en-US" b="1" dirty="0" smtClean="0"/>
+              <a:t>Bold on</a:t>
+            </a:r>
+            <a:endParaRPr lang="en-US" b="1" dirty="0"/>
+          </a:p>
+        </p:txBody>
+      </p:sp>
+      <p:sp>
+        <p:nvSpPr>
+          <p:cNvPr id="3" name="TextBox 2"/>
+          <p:cNvSpPr txBox="1"/>
+          <p:nvPr/>
+        </p:nvSpPr>
+        <p:spPr>
+          <a:xfrm>
+            <a:off x="4114183" y="3244334"/>
+            <a:ext cx="915635" cy="369332"/>
+          </a:xfrm>
+          <a:prstGeom prst="rect">
+            <a:avLst/>
+          </a:prstGeom>
+          <a:noFill/>
+        </p:spPr>
+        <p:txBody>
+          <a:bodyPr wrap="none" rtlCol="0">
+            <a:spAutoFit/>
+          </a:bodyPr>
+          <a:lstStyle/>
+          <a:p>
+            <a:r>
+              <a:rPr b="0" lang="en-US" dirty="0" smtClean="0"/>
+              <a:t>Bold off</a:t>
+            </a:r>
+            <a:endParaRPr lang="en-US" dirty="0"/>
+          </a:p>
+        </p:txBody>
+      </p:sp>
+      <p:sp>
+        <p:nvSpPr>
+          <p:cNvPr id="4" name="TextBox 3"/>
+          <p:cNvSpPr txBox="1"/>
+          <p:nvPr/>
+        </p:nvSpPr>
+        <p:spPr>
+          <a:xfrm>
+            <a:off x="3582712" y="5051167"/>
+            <a:ext cx="1978577" cy="369332"/>
+          </a:xfrm>
+          <a:prstGeom prst="rect">
+            <a:avLst/>
+          </a:prstGeom>
+          <a:noFill/>
+        </p:spPr>
+        <p:txBody>
+          <a:bodyPr wrap="none" rtlCol="0">
+            <a:spAutoFit/>
+          </a:bodyPr>
+          <a:lstStyle/>
+          <a:p>
+            <a:r>
+              <a:rPr lang="en-US" dirty="0" smtClean="0"/>
+              <a:t>Bold None (inherit)</a:t>
+            </a:r>
+            <a:endParaRPr lang="en-US" dirty="0"/>
+          </a:p>
+        </p:txBody>
+      </p:sp>
+    </p:spTree>
+    <p:extLst>
+      <p:ext uri="{BB962C8B-B14F-4D97-AF65-F5344CB8AC3E}">
+        <p14:creationId xmlns:p14="http://schemas.microsoft.com/office/powerpoint/2010/main" val="3772528789"/>
+      </p:ext>
+    </p:extLst>
+  </p:cSld>
+  <p:clrMapOvr>
+    <a:masterClrMapping/>
+  </p:clrMapOvr>
+</p:sld>
+</file>
+
 <file path=ppt/theme/theme1.xml><?xml version="1.0" encoding="utf-8"?>
 <a:theme xmlns:a="http://schemas.openxmlformats.org/drawingml/2006/main" name="Office Theme">
   <a:themeElements>

</xml_diff>

<commit_message>
acpt: add scenarios for Font.underline
</commit_message>
<xml_diff>
--- a/features/steps/test_files/txt-font-props.pptx
+++ b/features/steps/test_files/txt-font-props.pptx
@@ -8,6 +8,7 @@
     <p:sldId id="256" r:id="rId2"/>
     <p:sldId id="257" r:id="rId3"/>
     <p:sldId id="258" r:id="rId4"/>
+    <p:sldId id="259" r:id="rId5"/>
   </p:sldIdLst>
   <p:sldSz cx="9144000" cy="6858000" type="screen4x3"/>
   <p:notesSz cx="6858000" cy="9144000"/>
@@ -643,7 +644,7 @@
           <a:lstStyle/>
           <a:p>
             <a:r>
-              <a:rPr b="0" lang="en-US" dirty="0" smtClean="0"/>
+              <a:rPr lang="en-US" b="0" dirty="0" smtClean="0"/>
               <a:t>Bold off</a:t>
             </a:r>
             <a:endParaRPr lang="en-US" dirty="0"/>
@@ -684,6 +685,95 @@
     <p:extLst>
       <p:ext uri="{BB962C8B-B14F-4D97-AF65-F5344CB8AC3E}">
         <p14:creationId xmlns:p14="http://schemas.microsoft.com/office/powerpoint/2010/main" val="3772528789"/>
+      </p:ext>
+    </p:extLst>
+  </p:cSld>
+  <p:clrMapOvr>
+    <a:masterClrMapping/>
+  </p:clrMapOvr>
+</p:sld>
+</file>
+
+<file path=ppt/slides/slide4.xml><?xml version="1.0" encoding="utf-8"?>
+<p:sld xmlns:a="http://schemas.openxmlformats.org/drawingml/2006/main" xmlns:r="http://schemas.openxmlformats.org/officeDocument/2006/relationships" xmlns:p="http://schemas.openxmlformats.org/presentationml/2006/main">
+  <p:cSld>
+    <p:spTree>
+      <p:nvGrpSpPr>
+        <p:cNvPr id="1" name=""/>
+        <p:cNvGrpSpPr/>
+        <p:nvPr/>
+      </p:nvGrpSpPr>
+      <p:grpSpPr>
+        <a:xfrm>
+          <a:off x="0" y="0"/>
+          <a:ext cx="0" cy="0"/>
+          <a:chOff x="0" y="0"/>
+          <a:chExt cx="0" cy="0"/>
+        </a:xfrm>
+      </p:grpSpPr>
+      <p:sp>
+        <p:nvSpPr>
+          <p:cNvPr id="2" name="TextBox 1"/>
+          <p:cNvSpPr txBox="1"/>
+          <p:nvPr/>
+        </p:nvSpPr>
+        <p:spPr>
+          <a:xfrm>
+            <a:off x="3662850" y="2690336"/>
+            <a:ext cx="1818301" cy="1477328"/>
+          </a:xfrm>
+          <a:prstGeom prst="rect">
+            <a:avLst/>
+          </a:prstGeom>
+          <a:noFill/>
+        </p:spPr>
+        <p:txBody>
+          <a:bodyPr wrap="none" rtlCol="0">
+            <a:spAutoFit/>
+          </a:bodyPr>
+          <a:lstStyle/>
+          <a:p>
+            <a:pPr algn="ctr"/>
+            <a:r>
+              <a:rPr lang="en-US" u="sng" dirty="0" smtClean="0"/>
+              <a:t>Underline on</a:t>
+            </a:r>
+            <a:br>
+              <a:rPr lang="en-US" u="sng" dirty="0" smtClean="0"/>
+            </a:br>
+            <a:r>
+              <a:rPr lang="en-US" u="none" dirty="0" smtClean="0"/>
+              <a:t>Underline off</a:t>
+            </a:r>
+            <a:br>
+              <a:rPr lang="en-US" dirty="0" smtClean="0"/>
+            </a:br>
+            <a:r>
+              <a:rPr lang="en-US" dirty="0" smtClean="0"/>
+              <a:t>Underline inherit</a:t>
+            </a:r>
+            <a:br>
+              <a:rPr lang="en-US" dirty="0" smtClean="0"/>
+            </a:br>
+            <a:r>
+              <a:rPr lang="en-US" u="dbl" dirty="0" smtClean="0"/>
+              <a:t>Underline double</a:t>
+            </a:r>
+            <a:br>
+              <a:rPr lang="en-US" u="dbl" dirty="0" smtClean="0"/>
+            </a:br>
+            <a:r>
+              <a:rPr lang="en-US" u="wavy" dirty="0" smtClean="0"/>
+              <a:t>Underline wavy</a:t>
+            </a:r>
+            <a:endParaRPr lang="en-US" u="wavy" dirty="0"/>
+          </a:p>
+        </p:txBody>
+      </p:sp>
+    </p:spTree>
+    <p:extLst>
+      <p:ext uri="{BB962C8B-B14F-4D97-AF65-F5344CB8AC3E}">
+        <p14:creationId xmlns:p14="http://schemas.microsoft.com/office/powerpoint/2010/main" val="532203995"/>
       </p:ext>
     </p:extLst>
   </p:cSld>

</xml_diff>

<commit_message>
acpt: add scenarios for Font.language_id
</commit_message>
<xml_diff>
--- a/features/steps/test_files/txt-font-props.pptx
+++ b/features/steps/test_files/txt-font-props.pptx
@@ -9,6 +9,7 @@
     <p:sldId id="257" r:id="rId3"/>
     <p:sldId id="258" r:id="rId4"/>
     <p:sldId id="259" r:id="rId5"/>
+    <p:sldId id="260" r:id="rId6"/>
   </p:sldIdLst>
   <p:sldSz cx="9144000" cy="6858000" type="screen4x3"/>
   <p:notesSz cx="6858000" cy="9144000"/>
@@ -774,6 +775,126 @@
     <p:extLst>
       <p:ext uri="{BB962C8B-B14F-4D97-AF65-F5344CB8AC3E}">
         <p14:creationId xmlns:p14="http://schemas.microsoft.com/office/powerpoint/2010/main" val="532203995"/>
+      </p:ext>
+    </p:extLst>
+  </p:cSld>
+  <p:clrMapOvr>
+    <a:masterClrMapping/>
+  </p:clrMapOvr>
+</p:sld>
+</file>
+
+<file path=ppt/slides/slide5.xml><?xml version="1.0" encoding="utf-8"?>
+<p:sld xmlns:a="http://schemas.openxmlformats.org/drawingml/2006/main" xmlns:r="http://schemas.openxmlformats.org/officeDocument/2006/relationships" xmlns:p="http://schemas.openxmlformats.org/presentationml/2006/main">
+  <p:cSld>
+    <p:spTree>
+      <p:nvGrpSpPr>
+        <p:cNvPr id="1" name=""/>
+        <p:cNvGrpSpPr/>
+        <p:nvPr/>
+      </p:nvGrpSpPr>
+      <p:grpSpPr>
+        <a:xfrm>
+          <a:off x="0" y="0"/>
+          <a:ext cx="0" cy="0"/>
+          <a:chOff x="0" y="0"/>
+          <a:chExt cx="0" cy="0"/>
+        </a:xfrm>
+      </p:grpSpPr>
+      <p:sp>
+        <p:nvSpPr>
+          <p:cNvPr id="2" name="TextBox 1"/>
+          <p:cNvSpPr txBox="1"/>
+          <p:nvPr/>
+        </p:nvSpPr>
+        <p:spPr>
+          <a:xfrm>
+            <a:off x="2952093" y="1437501"/>
+            <a:ext cx="3239814" cy="369332"/>
+          </a:xfrm>
+          <a:prstGeom prst="rect">
+            <a:avLst/>
+          </a:prstGeom>
+          <a:noFill/>
+        </p:spPr>
+        <p:txBody>
+          <a:bodyPr wrap="none" rtlCol="0">
+            <a:spAutoFit/>
+          </a:bodyPr>
+          <a:lstStyle/>
+          <a:p>
+            <a:r>
+              <a:rPr dirty="0" smtClean="0"/>
+              <a:t>Shape 0 – no explicit language id</a:t>
+            </a:r>
+            <a:endParaRPr lang="en-US" dirty="0"/>
+          </a:p>
+        </p:txBody>
+      </p:sp>
+      <p:sp>
+        <p:nvSpPr>
+          <p:cNvPr id="3" name="TextBox 2"/>
+          <p:cNvSpPr txBox="1"/>
+          <p:nvPr/>
+        </p:nvSpPr>
+        <p:spPr>
+          <a:xfrm>
+            <a:off x="2613453" y="3244334"/>
+            <a:ext cx="3917095" cy="369332"/>
+          </a:xfrm>
+          <a:prstGeom prst="rect">
+            <a:avLst/>
+          </a:prstGeom>
+          <a:noFill/>
+        </p:spPr>
+        <p:txBody>
+          <a:bodyPr wrap="none" rtlCol="0">
+            <a:spAutoFit/>
+          </a:bodyPr>
+          <a:lstStyle/>
+          <a:p>
+            <a:r>
+              <a:rPr lang="fr-FR" dirty="0" smtClean="0"/>
+              <a:t>Shape 1 – MSO_LANGUAGE_ID.FRENCH</a:t>
+            </a:r>
+            <a:endParaRPr lang="fr-FR" dirty="0"/>
+          </a:p>
+        </p:txBody>
+      </p:sp>
+      <p:sp>
+        <p:nvSpPr>
+          <p:cNvPr id="4" name="TextBox 3"/>
+          <p:cNvSpPr txBox="1"/>
+          <p:nvPr/>
+        </p:nvSpPr>
+        <p:spPr>
+          <a:xfrm>
+            <a:off x="2654874" y="5051167"/>
+            <a:ext cx="3834253" cy="369332"/>
+          </a:xfrm>
+          <a:prstGeom prst="rect">
+            <a:avLst/>
+          </a:prstGeom>
+          <a:noFill/>
+        </p:spPr>
+        <p:txBody>
+          <a:bodyPr wrap="none" rtlCol="0">
+            <a:spAutoFit/>
+          </a:bodyPr>
+          <a:lstStyle/>
+          <a:p>
+            <a:r>
+              <a:rPr lang="pl-PL" dirty="0" smtClean="0"/>
+              <a:t>Shape 2 – MSO_LANGUAGE_ID.POLISH</a:t>
+            </a:r>
+            <a:endParaRPr lang="pl-PL" dirty="0"/>
+          </a:p>
+        </p:txBody>
+      </p:sp>
+    </p:spTree>
+    <p:extLst>
+      <p:ext uri="{BB962C8B-B14F-4D97-AF65-F5344CB8AC3E}">
+        <p14:creationId xmlns:p14="http://schemas.microsoft.com/office/powerpoint/2010/main" val="2695938300"/>
       </p:ext>
     </p:extLst>
   </p:cSld>

</xml_diff>